<commit_message>
add link for github try tutorial
</commit_message>
<xml_diff>
--- a/SourceControl/slides.pptx
+++ b/SourceControl/slides.pptx
@@ -9,7 +9,7 @@
     <p:sldId id="257" r:id="rId3"/>
     <p:sldId id="258" r:id="rId4"/>
     <p:sldId id="260" r:id="rId5"/>
-    <p:sldId id="259" r:id="rId6"/>
+    <p:sldId id="262" r:id="rId6"/>
     <p:sldId id="261" r:id="rId7"/>
   </p:sldIdLst>
   <p:sldSz cx="12192000" cy="6858000"/>
@@ -6156,6 +6156,10 @@
           <a:bodyPr/>
           <a:lstStyle/>
           <a:p>
+            <a:r>
+              <a:rPr lang="pl-PL" dirty="0" smtClean="0"/>
+              <a:t>Git – jak to się stało ze to powstało ?</a:t>
+            </a:r>
             <a:endParaRPr lang="pl-PL" dirty="0"/>
           </a:p>
         </p:txBody>
@@ -6167,34 +6171,24 @@
             <a:spLocks noGrp="1"/>
           </p:cNvSpPr>
           <p:nvPr>
-            <p:ph sz="half" idx="1"/>
+            <p:ph idx="1"/>
           </p:nvPr>
         </p:nvSpPr>
         <p:spPr/>
         <p:txBody>
-          <a:bodyPr/>
-          <a:lstStyle/>
-          <a:p>
-            <a:endParaRPr lang="pl-PL"/>
-          </a:p>
-        </p:txBody>
-      </p:sp>
-      <p:sp>
-        <p:nvSpPr>
-          <p:cNvPr id="4" name="Symbol zastępczy zawartości 3"/>
-          <p:cNvSpPr>
-            <a:spLocks noGrp="1"/>
-          </p:cNvSpPr>
-          <p:nvPr>
-            <p:ph sz="half" idx="2"/>
-          </p:nvPr>
-        </p:nvSpPr>
-        <p:spPr/>
-        <p:txBody>
-          <a:bodyPr/>
-          <a:lstStyle/>
-          <a:p>
-            <a:endParaRPr lang="pl-PL"/>
+          <a:bodyPr>
+            <a:normAutofit/>
+          </a:bodyPr>
+          <a:lstStyle/>
+          <a:p>
+            <a:pPr marL="0" indent="0">
+              <a:buNone/>
+            </a:pPr>
+            <a:r>
+              <a:rPr lang="pl-PL" sz="4000" dirty="0" smtClean="0"/>
+              <a:t>Linuks, to od tego wszystko się zaczęło!</a:t>
+            </a:r>
+            <a:endParaRPr lang="pl-PL" sz="4000" dirty="0"/>
           </a:p>
         </p:txBody>
       </p:sp>
@@ -6244,40 +6238,8 @@
           <a:lstStyle/>
           <a:p>
             <a:r>
-              <a:rPr lang="pl-PL" dirty="0" err="1" smtClean="0"/>
-              <a:t>Trunk</a:t>
-            </a:r>
-            <a:r>
               <a:rPr lang="pl-PL" dirty="0" smtClean="0"/>
-              <a:t>, </a:t>
-            </a:r>
-            <a:r>
-              <a:rPr lang="pl-PL" dirty="0" err="1" smtClean="0"/>
-              <a:t>branch</a:t>
-            </a:r>
-            <a:r>
-              <a:rPr lang="pl-PL" dirty="0" smtClean="0"/>
-              <a:t>, </a:t>
-            </a:r>
-            <a:r>
-              <a:rPr lang="pl-PL" dirty="0" err="1" smtClean="0"/>
-              <a:t>tag</a:t>
-            </a:r>
-            <a:r>
-              <a:rPr lang="pl-PL" dirty="0" smtClean="0"/>
-              <a:t>, </a:t>
-            </a:r>
-            <a:r>
-              <a:rPr lang="pl-PL" dirty="0" err="1" smtClean="0"/>
-              <a:t>remote</a:t>
-            </a:r>
-            <a:r>
-              <a:rPr lang="pl-PL" dirty="0" smtClean="0"/>
-              <a:t> </a:t>
-            </a:r>
-            <a:r>
-              <a:rPr lang="pl-PL" dirty="0" err="1" smtClean="0"/>
-              <a:t>repo</a:t>
+              <a:t>Instalacja i Demo</a:t>
             </a:r>
             <a:endParaRPr lang="pl-PL" dirty="0"/>
           </a:p>
@@ -6285,12 +6247,12 @@
       </p:sp>
       <p:sp>
         <p:nvSpPr>
-          <p:cNvPr id="4" name="Symbol zastępczy zawartości 3"/>
-          <p:cNvSpPr>
-            <a:spLocks noGrp="1"/>
-          </p:cNvSpPr>
-          <p:nvPr>
-            <p:ph sz="half" idx="2"/>
+          <p:cNvPr id="3" name="Symbol zastępczy zawartości 2"/>
+          <p:cNvSpPr>
+            <a:spLocks noGrp="1"/>
+          </p:cNvSpPr>
+          <p:nvPr>
+            <p:ph idx="1"/>
           </p:nvPr>
         </p:nvSpPr>
         <p:spPr/>
@@ -6298,43 +6260,32 @@
           <a:bodyPr/>
           <a:lstStyle/>
           <a:p>
-            <a:endParaRPr lang="pl-PL"/>
-          </a:p>
-        </p:txBody>
-      </p:sp>
-      <p:pic>
-        <p:nvPicPr>
-          <p:cNvPr id="5" name="Symbol zastępczy zawartości 3"/>
-          <p:cNvPicPr>
-            <a:picLocks noGrp="1" noChangeAspect="1"/>
-          </p:cNvPicPr>
-          <p:nvPr>
-            <p:ph sz="half" idx="1"/>
-          </p:nvPr>
-        </p:nvPicPr>
-        <p:blipFill>
-          <a:blip r:embed="rId2">
-            <a:extLst>
-              <a:ext uri="{28A0092B-C50C-407E-A947-70E740481C1C}">
-                <a14:useLocalDpi xmlns:a14="http://schemas.microsoft.com/office/drawing/2010/main" val="0"/>
-              </a:ext>
-            </a:extLst>
-          </a:blip>
-          <a:stretch>
-            <a:fillRect/>
-          </a:stretch>
-        </p:blipFill>
-        <p:spPr>
-          <a:xfrm>
-            <a:off x="1978731" y="2160588"/>
-            <a:ext cx="1581326" cy="3881437"/>
-          </a:xfrm>
-        </p:spPr>
-      </p:pic>
+            <a:r>
+              <a:rPr lang="pl-PL" dirty="0">
+                <a:hlinkClick r:id="rId2"/>
+              </a:rPr>
+              <a:t>http://msysgit.github.com</a:t>
+            </a:r>
+            <a:r>
+              <a:rPr lang="pl-PL" dirty="0" smtClean="0">
+                <a:hlinkClick r:id="rId2"/>
+              </a:rPr>
+              <a:t>/</a:t>
+            </a:r>
+            <a:endParaRPr lang="pl-PL" dirty="0" smtClean="0"/>
+          </a:p>
+          <a:p>
+            <a:r>
+              <a:rPr lang="pl-PL" dirty="0"/>
+              <a:t>http://try.github.io/levels/1/challenges/1</a:t>
+            </a:r>
+          </a:p>
+        </p:txBody>
+      </p:sp>
     </p:spTree>
     <p:extLst>
       <p:ext uri="{BB962C8B-B14F-4D97-AF65-F5344CB8AC3E}">
-        <p14:creationId xmlns:p14="http://schemas.microsoft.com/office/powerpoint/2010/main" val="1860298700"/>
+        <p14:creationId xmlns:p14="http://schemas.microsoft.com/office/powerpoint/2010/main" val="3877153064"/>
       </p:ext>
     </p:extLst>
   </p:cSld>
@@ -6420,8 +6371,23 @@
           </a:p>
           <a:p>
             <a:r>
+              <a:rPr lang="pl-PL" dirty="0">
+                <a:hlinkClick r:id="rId3"/>
+              </a:rPr>
+              <a:t>http://</a:t>
+            </a:r>
+            <a:r>
+              <a:rPr lang="pl-PL" dirty="0" smtClean="0">
+                <a:hlinkClick r:id="rId3"/>
+              </a:rPr>
+              <a:t>git-scm.com/book/pl/Pierwsze-kroki-Wprowadzenie-do-kontroli-wersji</a:t>
+            </a:r>
+            <a:endParaRPr lang="pl-PL" dirty="0" smtClean="0"/>
+          </a:p>
+          <a:p>
+            <a:r>
               <a:rPr lang="pl-PL" dirty="0"/>
-              <a:t>http://git-scm.com/book/pl/Pierwsze-kroki-Wprowadzenie-do-kontroli-wersji</a:t>
+              <a:t>http://try.github.io/levels/1/challenges/1</a:t>
             </a:r>
           </a:p>
         </p:txBody>

</xml_diff>